<commit_message>
Final FInal FInal presentation
</commit_message>
<xml_diff>
--- a/Airline_Sentiment_Analysis_Presentation.pptx
+++ b/Airline_Sentiment_Analysis_Presentation.pptx
@@ -5,10 +5,10 @@
     <p:sldMasterId id="2147484163" r:id="rId1"/>
   </p:sldMasterIdLst>
   <p:notesMasterIdLst>
-    <p:notesMasterId r:id="rId22"/>
+    <p:notesMasterId r:id="rId23"/>
   </p:notesMasterIdLst>
   <p:handoutMasterIdLst>
-    <p:handoutMasterId r:id="rId23"/>
+    <p:handoutMasterId r:id="rId24"/>
   </p:handoutMasterIdLst>
   <p:sldIdLst>
     <p:sldId id="257" r:id="rId2"/>
@@ -31,6 +31,7 @@
     <p:sldId id="313" r:id="rId19"/>
     <p:sldId id="314" r:id="rId20"/>
     <p:sldId id="315" r:id="rId21"/>
+    <p:sldId id="317" r:id="rId22"/>
   </p:sldIdLst>
   <p:sldSz cx="12192000" cy="6858000"/>
   <p:notesSz cx="6858000" cy="9144000"/>
@@ -39850,6 +39851,217 @@
 </p:sld>
 </file>
 
+<file path=ppt/slides/slide21.xml><?xml version="1.0" encoding="utf-8"?>
+<p:sld xmlns:a="http://schemas.openxmlformats.org/drawingml/2006/main" xmlns:r="http://schemas.openxmlformats.org/officeDocument/2006/relationships" xmlns:p="http://schemas.openxmlformats.org/presentationml/2006/main">
+  <p:cSld>
+    <p:spTree>
+      <p:nvGrpSpPr>
+        <p:cNvPr id="1" name=""/>
+        <p:cNvGrpSpPr/>
+        <p:nvPr/>
+      </p:nvGrpSpPr>
+      <p:grpSpPr>
+        <a:xfrm>
+          <a:off x="0" y="0"/>
+          <a:ext cx="0" cy="0"/>
+          <a:chOff x="0" y="0"/>
+          <a:chExt cx="0" cy="0"/>
+        </a:xfrm>
+      </p:grpSpPr>
+      <p:sp>
+        <p:nvSpPr>
+          <p:cNvPr id="2" name="Title 1">
+            <a:extLst>
+              <a:ext uri="{FF2B5EF4-FFF2-40B4-BE49-F238E27FC236}">
+                <a16:creationId xmlns:a16="http://schemas.microsoft.com/office/drawing/2014/main" id="{5C7BDB03-7025-AFC4-B3CD-1548FCF38718}"/>
+              </a:ext>
+            </a:extLst>
+          </p:cNvPr>
+          <p:cNvSpPr>
+            <a:spLocks noGrp="1"/>
+          </p:cNvSpPr>
+          <p:nvPr>
+            <p:ph type="title"/>
+          </p:nvPr>
+        </p:nvSpPr>
+        <p:spPr>
+          <a:xfrm>
+            <a:off x="1143000" y="609600"/>
+            <a:ext cx="6132446" cy="1905000"/>
+          </a:xfrm>
+        </p:spPr>
+        <p:txBody>
+          <a:bodyPr vert="horz" lIns="91440" tIns="45720" rIns="91440" bIns="45720" rtlCol="0" anchor="ctr">
+            <a:normAutofit/>
+          </a:bodyPr>
+          <a:lstStyle/>
+          <a:p>
+            <a:r>
+              <a:rPr lang="en-US" dirty="0"/>
+              <a:t>references</a:t>
+            </a:r>
+          </a:p>
+        </p:txBody>
+      </p:sp>
+      <p:sp>
+        <p:nvSpPr>
+          <p:cNvPr id="7" name="Content Placeholder 6">
+            <a:extLst>
+              <a:ext uri="{FF2B5EF4-FFF2-40B4-BE49-F238E27FC236}">
+                <a16:creationId xmlns:a16="http://schemas.microsoft.com/office/drawing/2014/main" id="{8CDFE52F-B343-5104-8AEE-08E8EB928EDF}"/>
+              </a:ext>
+            </a:extLst>
+          </p:cNvPr>
+          <p:cNvSpPr>
+            <a:spLocks noGrp="1"/>
+          </p:cNvSpPr>
+          <p:nvPr>
+            <p:ph sz="half" idx="2"/>
+          </p:nvPr>
+        </p:nvSpPr>
+        <p:spPr>
+          <a:xfrm>
+            <a:off x="1143000" y="2666999"/>
+            <a:ext cx="5943600" cy="3395871"/>
+          </a:xfrm>
+        </p:spPr>
+        <p:txBody>
+          <a:bodyPr vert="horz" lIns="91440" tIns="45720" rIns="91440" bIns="45720" rtlCol="0" anchor="ctr">
+            <a:normAutofit/>
+          </a:bodyPr>
+          <a:lstStyle/>
+          <a:p>
+            <a:r>
+              <a:rPr lang="en-US" b="0" i="0" u="sng" dirty="0">
+                <a:effectLst/>
+                <a:latin typeface="gg sans"/>
+                <a:hlinkClick r:id="rId2" tooltip="https://realpython.com/k-means-clustering-python/"/>
+              </a:rPr>
+              <a:t>https://realpython.com/k-means-clustering-python/</a:t>
+            </a:r>
+            <a:endParaRPr lang="en-US" b="0" i="0" u="sng" dirty="0">
+              <a:effectLst/>
+              <a:latin typeface="gg sans"/>
+            </a:endParaRPr>
+          </a:p>
+          <a:p>
+            <a:r>
+              <a:rPr lang="en-US" dirty="0">
+                <a:hlinkClick r:id="rId3"/>
+              </a:rPr>
+              <a:t>https://www.mygreatlearning.com/blog/multinomial-naive-bayes-explained/</a:t>
+            </a:r>
+            <a:endParaRPr lang="en-US" u="sng" dirty="0">
+              <a:effectLst/>
+              <a:latin typeface="gg sans"/>
+            </a:endParaRPr>
+          </a:p>
+          <a:p>
+            <a:r>
+              <a:rPr lang="en-US" dirty="0">
+                <a:hlinkClick r:id="rId4"/>
+              </a:rPr>
+              <a:t>https://www.w3schools.com/python/python_ml_decision_tree.asp</a:t>
+            </a:r>
+            <a:endParaRPr lang="en-US" u="sng" dirty="0">
+              <a:effectLst/>
+              <a:latin typeface="gg sans"/>
+            </a:endParaRPr>
+          </a:p>
+          <a:p>
+            <a:r>
+              <a:rPr lang="en-US" dirty="0">
+                <a:hlinkClick r:id="rId5"/>
+              </a:rPr>
+              <a:t>https://www.kaggle.com/datasets/crowdflower/twitter-airline-sentiment</a:t>
+            </a:r>
+            <a:endParaRPr lang="en-US" u="sng" dirty="0">
+              <a:effectLst/>
+              <a:latin typeface="gg sans"/>
+            </a:endParaRPr>
+          </a:p>
+          <a:p>
+            <a:r>
+              <a:rPr lang="en-US" dirty="0">
+                <a:hlinkClick r:id="rId6"/>
+              </a:rPr>
+              <a:t>https://chat.openai.com</a:t>
+            </a:r>
+            <a:r>
+              <a:rPr lang="en-US">
+                <a:hlinkClick r:id="rId6"/>
+              </a:rPr>
+              <a:t>/</a:t>
+            </a:r>
+            <a:endParaRPr lang="en-US" u="sng">
+              <a:effectLst/>
+              <a:latin typeface="gg sans"/>
+            </a:endParaRPr>
+          </a:p>
+          <a:p>
+            <a:endParaRPr lang="en-US" dirty="0"/>
+          </a:p>
+        </p:txBody>
+      </p:sp>
+      <p:sp>
+        <p:nvSpPr>
+          <p:cNvPr id="3" name="Slide Number Placeholder 2">
+            <a:extLst>
+              <a:ext uri="{FF2B5EF4-FFF2-40B4-BE49-F238E27FC236}">
+                <a16:creationId xmlns:a16="http://schemas.microsoft.com/office/drawing/2014/main" id="{613D262B-6853-DC5D-FEA8-F486F86A2E41}"/>
+              </a:ext>
+            </a:extLst>
+          </p:cNvPr>
+          <p:cNvSpPr>
+            <a:spLocks noGrp="1"/>
+          </p:cNvSpPr>
+          <p:nvPr>
+            <p:ph type="sldNum" sz="quarter" idx="12"/>
+          </p:nvPr>
+        </p:nvSpPr>
+        <p:spPr>
+          <a:xfrm>
+            <a:off x="10514012" y="6217920"/>
+            <a:ext cx="551167" cy="365125"/>
+          </a:xfrm>
+        </p:spPr>
+        <p:txBody>
+          <a:bodyPr vert="horz" lIns="91440" tIns="45720" rIns="91440" bIns="45720" rtlCol="0" anchor="ctr">
+            <a:normAutofit/>
+          </a:bodyPr>
+          <a:lstStyle/>
+          <a:p>
+            <a:pPr defTabSz="914400">
+              <a:spcAft>
+                <a:spcPts val="600"/>
+              </a:spcAft>
+            </a:pPr>
+            <a:fld id="{03DC2DEF-D2FE-4B45-ABA4-9F153FD1C98A}" type="slidenum">
+              <a:rPr lang="en-US" smtClean="0"/>
+              <a:pPr defTabSz="914400">
+                <a:spcAft>
+                  <a:spcPts val="600"/>
+                </a:spcAft>
+              </a:pPr>
+              <a:t>21</a:t>
+            </a:fld>
+            <a:endParaRPr lang="en-US"/>
+          </a:p>
+        </p:txBody>
+      </p:sp>
+    </p:spTree>
+    <p:extLst>
+      <p:ext uri="{BB962C8B-B14F-4D97-AF65-F5344CB8AC3E}">
+        <p14:creationId xmlns:p14="http://schemas.microsoft.com/office/powerpoint/2010/main" val="98795057"/>
+      </p:ext>
+    </p:extLst>
+  </p:cSld>
+  <p:clrMapOvr>
+    <a:masterClrMapping/>
+  </p:clrMapOvr>
+</p:sld>
+</file>
+
 <file path=ppt/slides/slide3.xml><?xml version="1.0" encoding="utf-8"?>
 <p:sld xmlns:a="http://schemas.openxmlformats.org/drawingml/2006/main" xmlns:r="http://schemas.openxmlformats.org/officeDocument/2006/relationships" xmlns:p="http://schemas.openxmlformats.org/presentationml/2006/main">
   <p:cSld>

</xml_diff>